<commit_message>
Aggiornamento slide e qualche commento nel codice
</commit_message>
<xml_diff>
--- a/campo_minato/docs/campo_minato.pptx
+++ b/campo_minato/docs/campo_minato.pptx
@@ -9,8 +9,10 @@
     <p:sldId id="257" r:id="rId3"/>
     <p:sldId id="258" r:id="rId4"/>
     <p:sldId id="260" r:id="rId5"/>
-    <p:sldId id="261" r:id="rId6"/>
-    <p:sldId id="262" r:id="rId7"/>
+    <p:sldId id="264" r:id="rId6"/>
+    <p:sldId id="261" r:id="rId7"/>
+    <p:sldId id="263" r:id="rId8"/>
+    <p:sldId id="262" r:id="rId9"/>
   </p:sldIdLst>
   <p:sldSz cx="12192000" cy="6858000"/>
   <p:notesSz cx="6858000" cy="9144000"/>
@@ -120,7 +122,7 @@
 <file path=ppt/revisionInfo.xml><?xml version="1.0" encoding="utf-8"?>
 <p1510:revInfo xmlns:a="http://schemas.openxmlformats.org/drawingml/2006/main" xmlns:r="http://schemas.openxmlformats.org/officeDocument/2006/relationships" xmlns:p1510="http://schemas.microsoft.com/office/powerpoint/2015/10/main">
   <p1510:revLst>
-    <p1510:client id="{B4580FE3-4207-4E2A-8B85-E1E005F7D5F3}" v="59" dt="2024-05-15T06:36:36.058"/>
+    <p1510:client id="{30657747-4604-48EC-873D-FD414A840B60}" v="4" dt="2024-05-28T06:47:45.010"/>
   </p1510:revLst>
 </p1510:revInfo>
 </file>
@@ -847,6 +849,389 @@
             <ac:cxnSpMk id="21" creationId="{F7C8EA93-3210-4C62-99E9-153C275E3A87}"/>
           </ac:cxnSpMkLst>
         </pc:cxnChg>
+      </pc:sldChg>
+    </pc:docChg>
+  </pc:docChgLst>
+  <pc:docChgLst>
+    <pc:chgData name="Luca Bertiato" userId="b725c848cd784440" providerId="LiveId" clId="{30657747-4604-48EC-873D-FD414A840B60}"/>
+    <pc:docChg chg="undo custSel addSld modSld sldOrd">
+      <pc:chgData name="Luca Bertiato" userId="b725c848cd784440" providerId="LiveId" clId="{30657747-4604-48EC-873D-FD414A840B60}" dt="2024-05-28T06:48:11.406" v="228" actId="20577"/>
+      <pc:docMkLst>
+        <pc:docMk/>
+      </pc:docMkLst>
+      <pc:sldChg chg="addSp delSp modSp new mod setBg">
+        <pc:chgData name="Luca Bertiato" userId="b725c848cd784440" providerId="LiveId" clId="{30657747-4604-48EC-873D-FD414A840B60}" dt="2024-05-28T06:48:11.406" v="228" actId="20577"/>
+        <pc:sldMkLst>
+          <pc:docMk/>
+          <pc:sldMk cId="2764990116" sldId="263"/>
+        </pc:sldMkLst>
+        <pc:spChg chg="add del">
+          <ac:chgData name="Luca Bertiato" userId="b725c848cd784440" providerId="LiveId" clId="{30657747-4604-48EC-873D-FD414A840B60}" dt="2024-05-28T06:14:23.488" v="2" actId="478"/>
+          <ac:spMkLst>
+            <pc:docMk/>
+            <pc:sldMk cId="2764990116" sldId="263"/>
+            <ac:spMk id="3" creationId="{7C95F66D-C0B9-62EE-A33A-3CF1256B4DAC}"/>
+          </ac:spMkLst>
+        </pc:spChg>
+        <pc:spChg chg="add mod ord">
+          <ac:chgData name="Luca Bertiato" userId="b725c848cd784440" providerId="LiveId" clId="{30657747-4604-48EC-873D-FD414A840B60}" dt="2024-05-28T06:48:11.406" v="228" actId="20577"/>
+          <ac:spMkLst>
+            <pc:docMk/>
+            <pc:sldMk cId="2764990116" sldId="263"/>
+            <ac:spMk id="10" creationId="{F282D56C-2888-FF7F-C686-7DC48E35B79A}"/>
+          </ac:spMkLst>
+        </pc:spChg>
+        <pc:spChg chg="add del">
+          <ac:chgData name="Luca Bertiato" userId="b725c848cd784440" providerId="LiveId" clId="{30657747-4604-48EC-873D-FD414A840B60}" dt="2024-05-28T06:23:19.684" v="53" actId="26606"/>
+          <ac:spMkLst>
+            <pc:docMk/>
+            <pc:sldMk cId="2764990116" sldId="263"/>
+            <ac:spMk id="15" creationId="{2111B97A-2FB0-4625-8C2E-CDCB1AF683A2}"/>
+          </ac:spMkLst>
+        </pc:spChg>
+        <pc:spChg chg="add del">
+          <ac:chgData name="Luca Bertiato" userId="b725c848cd784440" providerId="LiveId" clId="{30657747-4604-48EC-873D-FD414A840B60}" dt="2024-05-28T06:23:19.684" v="53" actId="26606"/>
+          <ac:spMkLst>
+            <pc:docMk/>
+            <pc:sldMk cId="2764990116" sldId="263"/>
+            <ac:spMk id="21" creationId="{8ED94938-268E-4C0A-A08A-B3980C78BAEB}"/>
+          </ac:spMkLst>
+        </pc:spChg>
+        <pc:spChg chg="add del">
+          <ac:chgData name="Luca Bertiato" userId="b725c848cd784440" providerId="LiveId" clId="{30657747-4604-48EC-873D-FD414A840B60}" dt="2024-05-28T06:22:50.099" v="46" actId="26606"/>
+          <ac:spMkLst>
+            <pc:docMk/>
+            <pc:sldMk cId="2764990116" sldId="263"/>
+            <ac:spMk id="26" creationId="{533BF18B-C8A1-400D-BBBD-6103EC90FE1A}"/>
+          </ac:spMkLst>
+        </pc:spChg>
+        <pc:spChg chg="add del">
+          <ac:chgData name="Luca Bertiato" userId="b725c848cd784440" providerId="LiveId" clId="{30657747-4604-48EC-873D-FD414A840B60}" dt="2024-05-28T06:22:50.099" v="46" actId="26606"/>
+          <ac:spMkLst>
+            <pc:docMk/>
+            <pc:sldMk cId="2764990116" sldId="263"/>
+            <ac:spMk id="28" creationId="{99413ED5-9ED4-4772-BCE4-2BCAE6B12E35}"/>
+          </ac:spMkLst>
+        </pc:spChg>
+        <pc:spChg chg="add del">
+          <ac:chgData name="Luca Bertiato" userId="b725c848cd784440" providerId="LiveId" clId="{30657747-4604-48EC-873D-FD414A840B60}" dt="2024-05-28T06:22:50.099" v="46" actId="26606"/>
+          <ac:spMkLst>
+            <pc:docMk/>
+            <pc:sldMk cId="2764990116" sldId="263"/>
+            <ac:spMk id="30" creationId="{04357C93-F0CB-4A1C-8F77-4E9063789819}"/>
+          </ac:spMkLst>
+        </pc:spChg>
+        <pc:spChg chg="add del">
+          <ac:chgData name="Luca Bertiato" userId="b725c848cd784440" providerId="LiveId" clId="{30657747-4604-48EC-873D-FD414A840B60}" dt="2024-05-28T06:22:50.099" v="46" actId="26606"/>
+          <ac:spMkLst>
+            <pc:docMk/>
+            <pc:sldMk cId="2764990116" sldId="263"/>
+            <ac:spMk id="32" creationId="{90F533E9-6690-41A8-A372-4C6C622D028D}"/>
+          </ac:spMkLst>
+        </pc:spChg>
+        <pc:spChg chg="add del">
+          <ac:chgData name="Luca Bertiato" userId="b725c848cd784440" providerId="LiveId" clId="{30657747-4604-48EC-873D-FD414A840B60}" dt="2024-05-28T06:22:54.984" v="48" actId="26606"/>
+          <ac:spMkLst>
+            <pc:docMk/>
+            <pc:sldMk cId="2764990116" sldId="263"/>
+            <ac:spMk id="34" creationId="{E3BF711F-F9A0-4EA4-B156-A79E9F362447}"/>
+          </ac:spMkLst>
+        </pc:spChg>
+        <pc:spChg chg="add del">
+          <ac:chgData name="Luca Bertiato" userId="b725c848cd784440" providerId="LiveId" clId="{30657747-4604-48EC-873D-FD414A840B60}" dt="2024-05-28T06:22:54.984" v="48" actId="26606"/>
+          <ac:spMkLst>
+            <pc:docMk/>
+            <pc:sldMk cId="2764990116" sldId="263"/>
+            <ac:spMk id="37" creationId="{8ED94938-268E-4C0A-A08A-B3980C78BAEB}"/>
+          </ac:spMkLst>
+        </pc:spChg>
+        <pc:spChg chg="add del">
+          <ac:chgData name="Luca Bertiato" userId="b725c848cd784440" providerId="LiveId" clId="{30657747-4604-48EC-873D-FD414A840B60}" dt="2024-05-28T06:23:18.686" v="50" actId="26606"/>
+          <ac:spMkLst>
+            <pc:docMk/>
+            <pc:sldMk cId="2764990116" sldId="263"/>
+            <ac:spMk id="39" creationId="{2111B97A-2FB0-4625-8C2E-CDCB1AF683A2}"/>
+          </ac:spMkLst>
+        </pc:spChg>
+        <pc:spChg chg="add del">
+          <ac:chgData name="Luca Bertiato" userId="b725c848cd784440" providerId="LiveId" clId="{30657747-4604-48EC-873D-FD414A840B60}" dt="2024-05-28T06:23:18.686" v="50" actId="26606"/>
+          <ac:spMkLst>
+            <pc:docMk/>
+            <pc:sldMk cId="2764990116" sldId="263"/>
+            <ac:spMk id="42" creationId="{8ED94938-268E-4C0A-A08A-B3980C78BAEB}"/>
+          </ac:spMkLst>
+        </pc:spChg>
+        <pc:spChg chg="add del">
+          <ac:chgData name="Luca Bertiato" userId="b725c848cd784440" providerId="LiveId" clId="{30657747-4604-48EC-873D-FD414A840B60}" dt="2024-05-28T06:23:19.669" v="52" actId="26606"/>
+          <ac:spMkLst>
+            <pc:docMk/>
+            <pc:sldMk cId="2764990116" sldId="263"/>
+            <ac:spMk id="44" creationId="{E3BF711F-F9A0-4EA4-B156-A79E9F362447}"/>
+          </ac:spMkLst>
+        </pc:spChg>
+        <pc:spChg chg="add del">
+          <ac:chgData name="Luca Bertiato" userId="b725c848cd784440" providerId="LiveId" clId="{30657747-4604-48EC-873D-FD414A840B60}" dt="2024-05-28T06:23:19.669" v="52" actId="26606"/>
+          <ac:spMkLst>
+            <pc:docMk/>
+            <pc:sldMk cId="2764990116" sldId="263"/>
+            <ac:spMk id="47" creationId="{8ED94938-268E-4C0A-A08A-B3980C78BAEB}"/>
+          </ac:spMkLst>
+        </pc:spChg>
+        <pc:spChg chg="add del">
+          <ac:chgData name="Luca Bertiato" userId="b725c848cd784440" providerId="LiveId" clId="{30657747-4604-48EC-873D-FD414A840B60}" dt="2024-05-28T06:23:39.496" v="57" actId="26606"/>
+          <ac:spMkLst>
+            <pc:docMk/>
+            <pc:sldMk cId="2764990116" sldId="263"/>
+            <ac:spMk id="49" creationId="{533BF18B-C8A1-400D-BBBD-6103EC90FE1A}"/>
+          </ac:spMkLst>
+        </pc:spChg>
+        <pc:spChg chg="add del">
+          <ac:chgData name="Luca Bertiato" userId="b725c848cd784440" providerId="LiveId" clId="{30657747-4604-48EC-873D-FD414A840B60}" dt="2024-05-28T06:23:39.496" v="57" actId="26606"/>
+          <ac:spMkLst>
+            <pc:docMk/>
+            <pc:sldMk cId="2764990116" sldId="263"/>
+            <ac:spMk id="50" creationId="{99413ED5-9ED4-4772-BCE4-2BCAE6B12E35}"/>
+          </ac:spMkLst>
+        </pc:spChg>
+        <pc:spChg chg="add del">
+          <ac:chgData name="Luca Bertiato" userId="b725c848cd784440" providerId="LiveId" clId="{30657747-4604-48EC-873D-FD414A840B60}" dt="2024-05-28T06:23:39.496" v="57" actId="26606"/>
+          <ac:spMkLst>
+            <pc:docMk/>
+            <pc:sldMk cId="2764990116" sldId="263"/>
+            <ac:spMk id="51" creationId="{04357C93-F0CB-4A1C-8F77-4E9063789819}"/>
+          </ac:spMkLst>
+        </pc:spChg>
+        <pc:spChg chg="add del">
+          <ac:chgData name="Luca Bertiato" userId="b725c848cd784440" providerId="LiveId" clId="{30657747-4604-48EC-873D-FD414A840B60}" dt="2024-05-28T06:23:39.496" v="57" actId="26606"/>
+          <ac:spMkLst>
+            <pc:docMk/>
+            <pc:sldMk cId="2764990116" sldId="263"/>
+            <ac:spMk id="52" creationId="{90F533E9-6690-41A8-A372-4C6C622D028D}"/>
+          </ac:spMkLst>
+        </pc:spChg>
+        <pc:spChg chg="add del">
+          <ac:chgData name="Luca Bertiato" userId="b725c848cd784440" providerId="LiveId" clId="{30657747-4604-48EC-873D-FD414A840B60}" dt="2024-05-28T06:23:39.485" v="56" actId="26606"/>
+          <ac:spMkLst>
+            <pc:docMk/>
+            <pc:sldMk cId="2764990116" sldId="263"/>
+            <ac:spMk id="57" creationId="{8C886788-700E-4D20-9F80-E0E96837A203}"/>
+          </ac:spMkLst>
+        </pc:spChg>
+        <pc:spChg chg="add del">
+          <ac:chgData name="Luca Bertiato" userId="b725c848cd784440" providerId="LiveId" clId="{30657747-4604-48EC-873D-FD414A840B60}" dt="2024-05-28T06:23:39.485" v="56" actId="26606"/>
+          <ac:spMkLst>
+            <pc:docMk/>
+            <pc:sldMk cId="2764990116" sldId="263"/>
+            <ac:spMk id="59" creationId="{1850674C-4E08-4C62-A3E2-6337FE4F7D86}"/>
+          </ac:spMkLst>
+        </pc:spChg>
+        <pc:spChg chg="add del">
+          <ac:chgData name="Luca Bertiato" userId="b725c848cd784440" providerId="LiveId" clId="{30657747-4604-48EC-873D-FD414A840B60}" dt="2024-05-28T06:23:39.485" v="56" actId="26606"/>
+          <ac:spMkLst>
+            <pc:docMk/>
+            <pc:sldMk cId="2764990116" sldId="263"/>
+            <ac:spMk id="61" creationId="{BCE4FF05-2B0C-4C97-A9B4-E163085A90E1}"/>
+          </ac:spMkLst>
+        </pc:spChg>
+        <pc:spChg chg="add del">
+          <ac:chgData name="Luca Bertiato" userId="b725c848cd784440" providerId="LiveId" clId="{30657747-4604-48EC-873D-FD414A840B60}" dt="2024-05-28T06:23:39.485" v="56" actId="26606"/>
+          <ac:spMkLst>
+            <pc:docMk/>
+            <pc:sldMk cId="2764990116" sldId="263"/>
+            <ac:spMk id="63" creationId="{529C2A7A-A6B6-4A56-B11C-8E967D88A60D}"/>
+          </ac:spMkLst>
+        </pc:spChg>
+        <pc:spChg chg="add del">
+          <ac:chgData name="Luca Bertiato" userId="b725c848cd784440" providerId="LiveId" clId="{30657747-4604-48EC-873D-FD414A840B60}" dt="2024-05-28T06:23:39.485" v="56" actId="26606"/>
+          <ac:spMkLst>
+            <pc:docMk/>
+            <pc:sldMk cId="2764990116" sldId="263"/>
+            <ac:spMk id="65" creationId="{FDBD7205-E536-4134-8768-AC3E1A3C5E59}"/>
+          </ac:spMkLst>
+        </pc:spChg>
+        <pc:spChg chg="add del">
+          <ac:chgData name="Luca Bertiato" userId="b725c848cd784440" providerId="LiveId" clId="{30657747-4604-48EC-873D-FD414A840B60}" dt="2024-05-28T06:23:57.368" v="61" actId="26606"/>
+          <ac:spMkLst>
+            <pc:docMk/>
+            <pc:sldMk cId="2764990116" sldId="263"/>
+            <ac:spMk id="67" creationId="{2111B97A-2FB0-4625-8C2E-CDCB1AF683A2}"/>
+          </ac:spMkLst>
+        </pc:spChg>
+        <pc:spChg chg="add del">
+          <ac:chgData name="Luca Bertiato" userId="b725c848cd784440" providerId="LiveId" clId="{30657747-4604-48EC-873D-FD414A840B60}" dt="2024-05-28T06:23:57.368" v="61" actId="26606"/>
+          <ac:spMkLst>
+            <pc:docMk/>
+            <pc:sldMk cId="2764990116" sldId="263"/>
+            <ac:spMk id="70" creationId="{8ED94938-268E-4C0A-A08A-B3980C78BAEB}"/>
+          </ac:spMkLst>
+        </pc:spChg>
+        <pc:spChg chg="add">
+          <ac:chgData name="Luca Bertiato" userId="b725c848cd784440" providerId="LiveId" clId="{30657747-4604-48EC-873D-FD414A840B60}" dt="2024-05-28T06:23:57.368" v="61" actId="26606"/>
+          <ac:spMkLst>
+            <pc:docMk/>
+            <pc:sldMk cId="2764990116" sldId="263"/>
+            <ac:spMk id="75" creationId="{E3BF711F-F9A0-4EA4-B156-A79E9F362447}"/>
+          </ac:spMkLst>
+        </pc:spChg>
+        <pc:spChg chg="add">
+          <ac:chgData name="Luca Bertiato" userId="b725c848cd784440" providerId="LiveId" clId="{30657747-4604-48EC-873D-FD414A840B60}" dt="2024-05-28T06:23:57.368" v="61" actId="26606"/>
+          <ac:spMkLst>
+            <pc:docMk/>
+            <pc:sldMk cId="2764990116" sldId="263"/>
+            <ac:spMk id="81" creationId="{8ED94938-268E-4C0A-A08A-B3980C78BAEB}"/>
+          </ac:spMkLst>
+        </pc:spChg>
+        <pc:grpChg chg="add del">
+          <ac:chgData name="Luca Bertiato" userId="b725c848cd784440" providerId="LiveId" clId="{30657747-4604-48EC-873D-FD414A840B60}" dt="2024-05-28T06:23:19.684" v="53" actId="26606"/>
+          <ac:grpSpMkLst>
+            <pc:docMk/>
+            <pc:sldMk cId="2764990116" sldId="263"/>
+            <ac:grpSpMk id="17" creationId="{B83D307E-DF68-43F8-97CE-0AAE950A7129}"/>
+          </ac:grpSpMkLst>
+        </pc:grpChg>
+        <pc:grpChg chg="add del">
+          <ac:chgData name="Luca Bertiato" userId="b725c848cd784440" providerId="LiveId" clId="{30657747-4604-48EC-873D-FD414A840B60}" dt="2024-05-28T06:22:54.984" v="48" actId="26606"/>
+          <ac:grpSpMkLst>
+            <pc:docMk/>
+            <pc:sldMk cId="2764990116" sldId="263"/>
+            <ac:grpSpMk id="35" creationId="{B83D307E-DF68-43F8-97CE-0AAE950A7129}"/>
+          </ac:grpSpMkLst>
+        </pc:grpChg>
+        <pc:grpChg chg="add del">
+          <ac:chgData name="Luca Bertiato" userId="b725c848cd784440" providerId="LiveId" clId="{30657747-4604-48EC-873D-FD414A840B60}" dt="2024-05-28T06:23:18.686" v="50" actId="26606"/>
+          <ac:grpSpMkLst>
+            <pc:docMk/>
+            <pc:sldMk cId="2764990116" sldId="263"/>
+            <ac:grpSpMk id="40" creationId="{B83D307E-DF68-43F8-97CE-0AAE950A7129}"/>
+          </ac:grpSpMkLst>
+        </pc:grpChg>
+        <pc:grpChg chg="add del">
+          <ac:chgData name="Luca Bertiato" userId="b725c848cd784440" providerId="LiveId" clId="{30657747-4604-48EC-873D-FD414A840B60}" dt="2024-05-28T06:23:19.669" v="52" actId="26606"/>
+          <ac:grpSpMkLst>
+            <pc:docMk/>
+            <pc:sldMk cId="2764990116" sldId="263"/>
+            <ac:grpSpMk id="45" creationId="{B83D307E-DF68-43F8-97CE-0AAE950A7129}"/>
+          </ac:grpSpMkLst>
+        </pc:grpChg>
+        <pc:grpChg chg="add del">
+          <ac:chgData name="Luca Bertiato" userId="b725c848cd784440" providerId="LiveId" clId="{30657747-4604-48EC-873D-FD414A840B60}" dt="2024-05-28T06:23:57.368" v="61" actId="26606"/>
+          <ac:grpSpMkLst>
+            <pc:docMk/>
+            <pc:sldMk cId="2764990116" sldId="263"/>
+            <ac:grpSpMk id="68" creationId="{B83D307E-DF68-43F8-97CE-0AAE950A7129}"/>
+          </ac:grpSpMkLst>
+        </pc:grpChg>
+        <pc:grpChg chg="add">
+          <ac:chgData name="Luca Bertiato" userId="b725c848cd784440" providerId="LiveId" clId="{30657747-4604-48EC-873D-FD414A840B60}" dt="2024-05-28T06:23:57.368" v="61" actId="26606"/>
+          <ac:grpSpMkLst>
+            <pc:docMk/>
+            <pc:sldMk cId="2764990116" sldId="263"/>
+            <ac:grpSpMk id="77" creationId="{B83D307E-DF68-43F8-97CE-0AAE950A7129}"/>
+          </ac:grpSpMkLst>
+        </pc:grpChg>
+        <pc:picChg chg="add del mod ord">
+          <ac:chgData name="Luca Bertiato" userId="b725c848cd784440" providerId="LiveId" clId="{30657747-4604-48EC-873D-FD414A840B60}" dt="2024-05-28T06:24:10.516" v="63" actId="1076"/>
+          <ac:picMkLst>
+            <pc:docMk/>
+            <pc:sldMk cId="2764990116" sldId="263"/>
+            <ac:picMk id="5" creationId="{F16DCFD2-3C45-AA11-3A9C-0DD51A5A0DB1}"/>
+          </ac:picMkLst>
+        </pc:picChg>
+        <pc:picChg chg="add mod ord">
+          <ac:chgData name="Luca Bertiato" userId="b725c848cd784440" providerId="LiveId" clId="{30657747-4604-48EC-873D-FD414A840B60}" dt="2024-05-28T06:24:10.516" v="63" actId="1076"/>
+          <ac:picMkLst>
+            <pc:docMk/>
+            <pc:sldMk cId="2764990116" sldId="263"/>
+            <ac:picMk id="7" creationId="{6D0CFF77-0FAF-5339-795F-0C005FF096B3}"/>
+          </ac:picMkLst>
+        </pc:picChg>
+        <pc:picChg chg="add mod ord">
+          <ac:chgData name="Luca Bertiato" userId="b725c848cd784440" providerId="LiveId" clId="{30657747-4604-48EC-873D-FD414A840B60}" dt="2024-05-28T06:24:10.516" v="63" actId="1076"/>
+          <ac:picMkLst>
+            <pc:docMk/>
+            <pc:sldMk cId="2764990116" sldId="263"/>
+            <ac:picMk id="9" creationId="{B2D92975-E6E8-8E7B-DD28-87589ADD8EA4}"/>
+          </ac:picMkLst>
+        </pc:picChg>
+      </pc:sldChg>
+      <pc:sldChg chg="addSp modSp new mod ord setBg">
+        <pc:chgData name="Luca Bertiato" userId="b725c848cd784440" providerId="LiveId" clId="{30657747-4604-48EC-873D-FD414A840B60}" dt="2024-05-28T06:45:03.803" v="129" actId="1076"/>
+        <pc:sldMkLst>
+          <pc:docMk/>
+          <pc:sldMk cId="748313665" sldId="264"/>
+        </pc:sldMkLst>
+        <pc:spChg chg="add mod">
+          <ac:chgData name="Luca Bertiato" userId="b725c848cd784440" providerId="LiveId" clId="{30657747-4604-48EC-873D-FD414A840B60}" dt="2024-05-28T06:44:17.326" v="88" actId="26606"/>
+          <ac:spMkLst>
+            <pc:docMk/>
+            <pc:sldMk cId="748313665" sldId="264"/>
+            <ac:spMk id="2" creationId="{44F2A6E3-B8DD-9701-DE4E-EBF750682CB9}"/>
+          </ac:spMkLst>
+        </pc:spChg>
+        <pc:spChg chg="add">
+          <ac:chgData name="Luca Bertiato" userId="b725c848cd784440" providerId="LiveId" clId="{30657747-4604-48EC-873D-FD414A840B60}" dt="2024-05-28T06:44:17.326" v="88" actId="26606"/>
+          <ac:spMkLst>
+            <pc:docMk/>
+            <pc:sldMk cId="748313665" sldId="264"/>
+            <ac:spMk id="15" creationId="{0855A890-B60B-4670-9DC2-69DC05015AB3}"/>
+          </ac:spMkLst>
+        </pc:spChg>
+        <pc:spChg chg="add">
+          <ac:chgData name="Luca Bertiato" userId="b725c848cd784440" providerId="LiveId" clId="{30657747-4604-48EC-873D-FD414A840B60}" dt="2024-05-28T06:44:17.326" v="88" actId="26606"/>
+          <ac:spMkLst>
+            <pc:docMk/>
+            <pc:sldMk cId="748313665" sldId="264"/>
+            <ac:spMk id="17" creationId="{90F533E9-6690-41A8-A372-4C6C622D028D}"/>
+          </ac:spMkLst>
+        </pc:spChg>
+        <pc:spChg chg="add">
+          <ac:chgData name="Luca Bertiato" userId="b725c848cd784440" providerId="LiveId" clId="{30657747-4604-48EC-873D-FD414A840B60}" dt="2024-05-28T06:44:17.326" v="88" actId="26606"/>
+          <ac:spMkLst>
+            <pc:docMk/>
+            <pc:sldMk cId="748313665" sldId="264"/>
+            <ac:spMk id="19" creationId="{99413ED5-9ED4-4772-BCE4-2BCAE6B12E35}"/>
+          </ac:spMkLst>
+        </pc:spChg>
+        <pc:spChg chg="add">
+          <ac:chgData name="Luca Bertiato" userId="b725c848cd784440" providerId="LiveId" clId="{30657747-4604-48EC-873D-FD414A840B60}" dt="2024-05-28T06:44:17.326" v="88" actId="26606"/>
+          <ac:spMkLst>
+            <pc:docMk/>
+            <pc:sldMk cId="748313665" sldId="264"/>
+            <ac:spMk id="21" creationId="{04357C93-F0CB-4A1C-8F77-4E9063789819}"/>
+          </ac:spMkLst>
+        </pc:spChg>
+        <pc:picChg chg="add mod">
+          <ac:chgData name="Luca Bertiato" userId="b725c848cd784440" providerId="LiveId" clId="{30657747-4604-48EC-873D-FD414A840B60}" dt="2024-05-28T06:44:53.323" v="126" actId="1076"/>
+          <ac:picMkLst>
+            <pc:docMk/>
+            <pc:sldMk cId="748313665" sldId="264"/>
+            <ac:picMk id="4" creationId="{47E6D29D-F3D0-7C83-8287-DE0FFE8A1EF4}"/>
+          </ac:picMkLst>
+        </pc:picChg>
+        <pc:picChg chg="add mod">
+          <ac:chgData name="Luca Bertiato" userId="b725c848cd784440" providerId="LiveId" clId="{30657747-4604-48EC-873D-FD414A840B60}" dt="2024-05-28T06:45:00.357" v="128" actId="1076"/>
+          <ac:picMkLst>
+            <pc:docMk/>
+            <pc:sldMk cId="748313665" sldId="264"/>
+            <ac:picMk id="6" creationId="{2F293F97-35D2-5382-A916-F26F801E1DDC}"/>
+          </ac:picMkLst>
+        </pc:picChg>
+        <pc:picChg chg="add mod">
+          <ac:chgData name="Luca Bertiato" userId="b725c848cd784440" providerId="LiveId" clId="{30657747-4604-48EC-873D-FD414A840B60}" dt="2024-05-28T06:44:44.726" v="123" actId="1037"/>
+          <ac:picMkLst>
+            <pc:docMk/>
+            <pc:sldMk cId="748313665" sldId="264"/>
+            <ac:picMk id="8" creationId="{5D096897-2512-FE0C-2708-7C31B2517FEB}"/>
+          </ac:picMkLst>
+        </pc:picChg>
+        <pc:picChg chg="add mod">
+          <ac:chgData name="Luca Bertiato" userId="b725c848cd784440" providerId="LiveId" clId="{30657747-4604-48EC-873D-FD414A840B60}" dt="2024-05-28T06:45:03.803" v="129" actId="1076"/>
+          <ac:picMkLst>
+            <pc:docMk/>
+            <pc:sldMk cId="748313665" sldId="264"/>
+            <ac:picMk id="10" creationId="{EF1B231A-6E31-A333-3783-DE459C79C457}"/>
+          </ac:picMkLst>
+        </pc:picChg>
       </pc:sldChg>
     </pc:docChg>
   </pc:docChgLst>
@@ -1000,7 +1385,7 @@
           <a:p>
             <a:fld id="{5F3D7ECF-4541-465B-86AB-E5CC586758A5}" type="datetimeFigureOut">
               <a:rPr lang="it-IT" smtClean="0"/>
-              <a:t>15/05/2024</a:t>
+              <a:t>28/05/2024</a:t>
             </a:fld>
             <a:endParaRPr lang="it-IT"/>
           </a:p>
@@ -1198,7 +1583,7 @@
           <a:p>
             <a:fld id="{5F3D7ECF-4541-465B-86AB-E5CC586758A5}" type="datetimeFigureOut">
               <a:rPr lang="it-IT" smtClean="0"/>
-              <a:t>15/05/2024</a:t>
+              <a:t>28/05/2024</a:t>
             </a:fld>
             <a:endParaRPr lang="it-IT"/>
           </a:p>
@@ -1406,7 +1791,7 @@
           <a:p>
             <a:fld id="{5F3D7ECF-4541-465B-86AB-E5CC586758A5}" type="datetimeFigureOut">
               <a:rPr lang="it-IT" smtClean="0"/>
-              <a:t>15/05/2024</a:t>
+              <a:t>28/05/2024</a:t>
             </a:fld>
             <a:endParaRPr lang="it-IT"/>
           </a:p>
@@ -1604,7 +1989,7 @@
           <a:p>
             <a:fld id="{5F3D7ECF-4541-465B-86AB-E5CC586758A5}" type="datetimeFigureOut">
               <a:rPr lang="it-IT" smtClean="0"/>
-              <a:t>15/05/2024</a:t>
+              <a:t>28/05/2024</a:t>
             </a:fld>
             <a:endParaRPr lang="it-IT"/>
           </a:p>
@@ -1879,7 +2264,7 @@
           <a:p>
             <a:fld id="{5F3D7ECF-4541-465B-86AB-E5CC586758A5}" type="datetimeFigureOut">
               <a:rPr lang="it-IT" smtClean="0"/>
-              <a:t>15/05/2024</a:t>
+              <a:t>28/05/2024</a:t>
             </a:fld>
             <a:endParaRPr lang="it-IT"/>
           </a:p>
@@ -2144,7 +2529,7 @@
           <a:p>
             <a:fld id="{5F3D7ECF-4541-465B-86AB-E5CC586758A5}" type="datetimeFigureOut">
               <a:rPr lang="it-IT" smtClean="0"/>
-              <a:t>15/05/2024</a:t>
+              <a:t>28/05/2024</a:t>
             </a:fld>
             <a:endParaRPr lang="it-IT"/>
           </a:p>
@@ -2556,7 +2941,7 @@
           <a:p>
             <a:fld id="{5F3D7ECF-4541-465B-86AB-E5CC586758A5}" type="datetimeFigureOut">
               <a:rPr lang="it-IT" smtClean="0"/>
-              <a:t>15/05/2024</a:t>
+              <a:t>28/05/2024</a:t>
             </a:fld>
             <a:endParaRPr lang="it-IT"/>
           </a:p>
@@ -2697,7 +3082,7 @@
           <a:p>
             <a:fld id="{5F3D7ECF-4541-465B-86AB-E5CC586758A5}" type="datetimeFigureOut">
               <a:rPr lang="it-IT" smtClean="0"/>
-              <a:t>15/05/2024</a:t>
+              <a:t>28/05/2024</a:t>
             </a:fld>
             <a:endParaRPr lang="it-IT"/>
           </a:p>
@@ -2810,7 +3195,7 @@
           <a:p>
             <a:fld id="{5F3D7ECF-4541-465B-86AB-E5CC586758A5}" type="datetimeFigureOut">
               <a:rPr lang="it-IT" smtClean="0"/>
-              <a:t>15/05/2024</a:t>
+              <a:t>28/05/2024</a:t>
             </a:fld>
             <a:endParaRPr lang="it-IT"/>
           </a:p>
@@ -3121,7 +3506,7 @@
           <a:p>
             <a:fld id="{5F3D7ECF-4541-465B-86AB-E5CC586758A5}" type="datetimeFigureOut">
               <a:rPr lang="it-IT" smtClean="0"/>
-              <a:t>15/05/2024</a:t>
+              <a:t>28/05/2024</a:t>
             </a:fld>
             <a:endParaRPr lang="it-IT"/>
           </a:p>
@@ -3409,7 +3794,7 @@
           <a:p>
             <a:fld id="{5F3D7ECF-4541-465B-86AB-E5CC586758A5}" type="datetimeFigureOut">
               <a:rPr lang="it-IT" smtClean="0"/>
-              <a:t>15/05/2024</a:t>
+              <a:t>28/05/2024</a:t>
             </a:fld>
             <a:endParaRPr lang="it-IT"/>
           </a:p>
@@ -3650,7 +4035,7 @@
           <a:p>
             <a:fld id="{5F3D7ECF-4541-465B-86AB-E5CC586758A5}" type="datetimeFigureOut">
               <a:rPr lang="it-IT" smtClean="0"/>
-              <a:t>15/05/2024</a:t>
+              <a:t>28/05/2024</a:t>
             </a:fld>
             <a:endParaRPr lang="it-IT"/>
           </a:p>
@@ -8208,6 +8593,479 @@
       </p:grpSpPr>
       <p:sp useBgFill="1">
         <p:nvSpPr>
+          <p:cNvPr id="15" name="Rectangle 14">
+            <a:extLst>
+              <a:ext uri="{FF2B5EF4-FFF2-40B4-BE49-F238E27FC236}">
+                <a16:creationId xmlns:a16="http://schemas.microsoft.com/office/drawing/2014/main" id="{0855A890-B60B-4670-9DC2-69DC05015AB3}"/>
+              </a:ext>
+              <a:ext uri="{C183D7F6-B498-43B3-948B-1728B52AA6E4}">
+                <adec:decorative xmlns:adec="http://schemas.microsoft.com/office/drawing/2017/decorative" val="1"/>
+              </a:ext>
+            </a:extLst>
+          </p:cNvPr>
+          <p:cNvSpPr>
+            <a:spLocks noGrp="1" noRot="1" noChangeAspect="1" noMove="1" noResize="1" noEditPoints="1" noAdjustHandles="1" noChangeArrowheads="1" noChangeShapeType="1" noTextEdit="1"/>
+          </p:cNvSpPr>
+          <p:nvPr>
+            <p:extLst>
+              <p:ext uri="{386F3935-93C4-4BCD-93E2-E3B085C9AB24}">
+                <p16:designElem xmlns:p16="http://schemas.microsoft.com/office/powerpoint/2015/main" val="1"/>
+              </p:ext>
+            </p:extLst>
+          </p:nvPr>
+        </p:nvSpPr>
+        <p:spPr>
+          <a:xfrm>
+            <a:off x="0" y="0"/>
+            <a:ext cx="12191999" cy="6857365"/>
+          </a:xfrm>
+          <a:prstGeom prst="rect">
+            <a:avLst/>
+          </a:prstGeom>
+          <a:ln>
+            <a:noFill/>
+          </a:ln>
+        </p:spPr>
+        <p:style>
+          <a:lnRef idx="2">
+            <a:schemeClr val="accent1">
+              <a:shade val="50000"/>
+            </a:schemeClr>
+          </a:lnRef>
+          <a:fillRef idx="1">
+            <a:schemeClr val="accent1"/>
+          </a:fillRef>
+          <a:effectRef idx="0">
+            <a:schemeClr val="accent1"/>
+          </a:effectRef>
+          <a:fontRef idx="minor">
+            <a:schemeClr val="lt1"/>
+          </a:fontRef>
+        </p:style>
+        <p:txBody>
+          <a:bodyPr rtlCol="0" anchor="ctr"/>
+          <a:lstStyle/>
+          <a:p>
+            <a:pPr algn="ctr"/>
+            <a:endParaRPr lang="en-US"/>
+          </a:p>
+        </p:txBody>
+      </p:sp>
+      <p:sp>
+        <p:nvSpPr>
+          <p:cNvPr id="2" name="Titolo 1">
+            <a:extLst>
+              <a:ext uri="{FF2B5EF4-FFF2-40B4-BE49-F238E27FC236}">
+                <a16:creationId xmlns:a16="http://schemas.microsoft.com/office/drawing/2014/main" id="{44F2A6E3-B8DD-9701-DE4E-EBF750682CB9}"/>
+              </a:ext>
+            </a:extLst>
+          </p:cNvPr>
+          <p:cNvSpPr txBox="1">
+            <a:spLocks/>
+          </p:cNvSpPr>
+          <p:nvPr/>
+        </p:nvSpPr>
+        <p:spPr>
+          <a:xfrm>
+            <a:off x="454467" y="2023110"/>
+            <a:ext cx="2469624" cy="2846070"/>
+          </a:xfrm>
+          <a:prstGeom prst="rect">
+            <a:avLst/>
+          </a:prstGeom>
+        </p:spPr>
+        <p:txBody>
+          <a:bodyPr vert="horz" lIns="91440" tIns="45720" rIns="91440" bIns="45720" rtlCol="0" anchor="ctr">
+            <a:normAutofit/>
+          </a:bodyPr>
+          <a:lstStyle>
+            <a:lvl1pPr algn="l" defTabSz="914400" rtl="0" eaLnBrk="1" latinLnBrk="0" hangingPunct="1">
+              <a:lnSpc>
+                <a:spcPct val="90000"/>
+              </a:lnSpc>
+              <a:spcBef>
+                <a:spcPct val="0"/>
+              </a:spcBef>
+              <a:buNone/>
+              <a:defRPr sz="4400" kern="1200">
+                <a:solidFill>
+                  <a:schemeClr val="tx1"/>
+                </a:solidFill>
+                <a:latin typeface="+mj-lt"/>
+                <a:ea typeface="+mj-ea"/>
+                <a:cs typeface="+mj-cs"/>
+              </a:defRPr>
+            </a:lvl1pPr>
+          </a:lstStyle>
+          <a:p>
+            <a:pPr>
+              <a:spcAft>
+                <a:spcPts val="600"/>
+              </a:spcAft>
+            </a:pPr>
+            <a:r>
+              <a:rPr lang="en-US" sz="3700"/>
+              <a:t>Campo di gioco</a:t>
+            </a:r>
+          </a:p>
+        </p:txBody>
+      </p:sp>
+      <p:sp>
+        <p:nvSpPr>
+          <p:cNvPr id="17" name="Rectangle 16">
+            <a:extLst>
+              <a:ext uri="{FF2B5EF4-FFF2-40B4-BE49-F238E27FC236}">
+                <a16:creationId xmlns:a16="http://schemas.microsoft.com/office/drawing/2014/main" id="{90F533E9-6690-41A8-A372-4C6C622D028D}"/>
+              </a:ext>
+              <a:ext uri="{C183D7F6-B498-43B3-948B-1728B52AA6E4}">
+                <adec:decorative xmlns:adec="http://schemas.microsoft.com/office/drawing/2017/decorative" val="1"/>
+              </a:ext>
+            </a:extLst>
+          </p:cNvPr>
+          <p:cNvSpPr>
+            <a:spLocks noGrp="1" noRot="1" noChangeAspect="1" noMove="1" noResize="1" noEditPoints="1" noAdjustHandles="1" noChangeArrowheads="1" noChangeShapeType="1" noTextEdit="1"/>
+          </p:cNvSpPr>
+          <p:nvPr>
+            <p:extLst>
+              <p:ext uri="{386F3935-93C4-4BCD-93E2-E3B085C9AB24}">
+                <p16:designElem xmlns:p16="http://schemas.microsoft.com/office/powerpoint/2015/main" val="1"/>
+              </p:ext>
+            </p:extLst>
+          </p:nvPr>
+        </p:nvSpPr>
+        <p:spPr>
+          <a:xfrm rot="5400000">
+            <a:off x="2522480" y="3392097"/>
+            <a:ext cx="1719072" cy="152382"/>
+          </a:xfrm>
+          <a:prstGeom prst="rect">
+            <a:avLst/>
+          </a:prstGeom>
+          <a:solidFill>
+            <a:schemeClr val="accent4"/>
+          </a:solidFill>
+          <a:ln>
+            <a:noFill/>
+          </a:ln>
+        </p:spPr>
+        <p:style>
+          <a:lnRef idx="2">
+            <a:schemeClr val="accent1">
+              <a:shade val="50000"/>
+            </a:schemeClr>
+          </a:lnRef>
+          <a:fillRef idx="1">
+            <a:schemeClr val="accent1"/>
+          </a:fillRef>
+          <a:effectRef idx="0">
+            <a:schemeClr val="accent1"/>
+          </a:effectRef>
+          <a:fontRef idx="minor">
+            <a:schemeClr val="lt1"/>
+          </a:fontRef>
+        </p:style>
+        <p:txBody>
+          <a:bodyPr rtlCol="0" anchor="ctr"/>
+          <a:lstStyle/>
+          <a:p>
+            <a:pPr algn="ctr"/>
+            <a:endParaRPr lang="en-US"/>
+          </a:p>
+        </p:txBody>
+      </p:sp>
+      <p:sp>
+        <p:nvSpPr>
+          <p:cNvPr id="19" name="Rectangle 18">
+            <a:extLst>
+              <a:ext uri="{FF2B5EF4-FFF2-40B4-BE49-F238E27FC236}">
+                <a16:creationId xmlns:a16="http://schemas.microsoft.com/office/drawing/2014/main" id="{99413ED5-9ED4-4772-BCE4-2BCAE6B12E35}"/>
+              </a:ext>
+              <a:ext uri="{C183D7F6-B498-43B3-948B-1728B52AA6E4}">
+                <adec:decorative xmlns:adec="http://schemas.microsoft.com/office/drawing/2017/decorative" val="1"/>
+              </a:ext>
+            </a:extLst>
+          </p:cNvPr>
+          <p:cNvSpPr>
+            <a:spLocks noGrp="1" noRot="1" noChangeAspect="1" noMove="1" noResize="1" noEditPoints="1" noAdjustHandles="1" noChangeArrowheads="1" noChangeShapeType="1" noTextEdit="1"/>
+          </p:cNvSpPr>
+          <p:nvPr>
+            <p:extLst>
+              <p:ext uri="{386F3935-93C4-4BCD-93E2-E3B085C9AB24}">
+                <p16:designElem xmlns:p16="http://schemas.microsoft.com/office/powerpoint/2015/main" val="1"/>
+              </p:ext>
+            </p:extLst>
+          </p:nvPr>
+        </p:nvSpPr>
+        <p:spPr>
+          <a:xfrm rot="16200000">
+            <a:off x="7042549" y="-827233"/>
+            <a:ext cx="1715478" cy="8583421"/>
+          </a:xfrm>
+          <a:prstGeom prst="rect">
+            <a:avLst/>
+          </a:prstGeom>
+          <a:solidFill>
+            <a:schemeClr val="accent4"/>
+          </a:solidFill>
+          <a:ln>
+            <a:noFill/>
+          </a:ln>
+        </p:spPr>
+        <p:style>
+          <a:lnRef idx="2">
+            <a:schemeClr val="accent1">
+              <a:shade val="50000"/>
+            </a:schemeClr>
+          </a:lnRef>
+          <a:fillRef idx="1">
+            <a:schemeClr val="accent1"/>
+          </a:fillRef>
+          <a:effectRef idx="0">
+            <a:schemeClr val="accent1"/>
+          </a:effectRef>
+          <a:fontRef idx="minor">
+            <a:schemeClr val="lt1"/>
+          </a:fontRef>
+        </p:style>
+        <p:txBody>
+          <a:bodyPr rtlCol="0" anchor="ctr"/>
+          <a:lstStyle/>
+          <a:p>
+            <a:pPr algn="ctr"/>
+            <a:endParaRPr lang="en-US" dirty="0"/>
+          </a:p>
+        </p:txBody>
+      </p:sp>
+      <p:sp>
+        <p:nvSpPr>
+          <p:cNvPr id="21" name="Rectangle 20">
+            <a:extLst>
+              <a:ext uri="{FF2B5EF4-FFF2-40B4-BE49-F238E27FC236}">
+                <a16:creationId xmlns:a16="http://schemas.microsoft.com/office/drawing/2014/main" id="{04357C93-F0CB-4A1C-8F77-4E9063789819}"/>
+              </a:ext>
+              <a:ext uri="{C183D7F6-B498-43B3-948B-1728B52AA6E4}">
+                <adec:decorative xmlns:adec="http://schemas.microsoft.com/office/drawing/2017/decorative" val="1"/>
+              </a:ext>
+            </a:extLst>
+          </p:cNvPr>
+          <p:cNvSpPr>
+            <a:spLocks noGrp="1" noRot="1" noChangeAspect="1" noMove="1" noResize="1" noEditPoints="1" noAdjustHandles="1" noChangeArrowheads="1" noChangeShapeType="1" noTextEdit="1"/>
+          </p:cNvSpPr>
+          <p:nvPr>
+            <p:extLst>
+              <p:ext uri="{386F3935-93C4-4BCD-93E2-E3B085C9AB24}">
+                <p16:designElem xmlns:p16="http://schemas.microsoft.com/office/powerpoint/2015/main" val="1"/>
+              </p:ext>
+            </p:extLst>
+          </p:nvPr>
+        </p:nvSpPr>
+        <p:spPr>
+          <a:xfrm>
+            <a:off x="3807283" y="664308"/>
+            <a:ext cx="8082632" cy="5600340"/>
+          </a:xfrm>
+          <a:prstGeom prst="rect">
+            <a:avLst/>
+          </a:prstGeom>
+          <a:solidFill>
+            <a:schemeClr val="bg1"/>
+          </a:solidFill>
+          <a:ln>
+            <a:noFill/>
+          </a:ln>
+          <a:effectLst>
+            <a:outerShdw blurRad="139700" dist="127000" dir="5400000" algn="t" rotWithShape="0">
+              <a:prstClr val="black">
+                <a:alpha val="15000"/>
+              </a:prstClr>
+            </a:outerShdw>
+          </a:effectLst>
+        </p:spPr>
+        <p:style>
+          <a:lnRef idx="2">
+            <a:schemeClr val="accent1">
+              <a:shade val="50000"/>
+            </a:schemeClr>
+          </a:lnRef>
+          <a:fillRef idx="1">
+            <a:schemeClr val="accent1"/>
+          </a:fillRef>
+          <a:effectRef idx="0">
+            <a:schemeClr val="accent1"/>
+          </a:effectRef>
+          <a:fontRef idx="minor">
+            <a:schemeClr val="lt1"/>
+          </a:fontRef>
+        </p:style>
+        <p:txBody>
+          <a:bodyPr rtlCol="0" anchor="ctr"/>
+          <a:lstStyle/>
+          <a:p>
+            <a:pPr algn="ctr"/>
+            <a:endParaRPr lang="en-US"/>
+          </a:p>
+        </p:txBody>
+      </p:sp>
+      <p:pic>
+        <p:nvPicPr>
+          <p:cNvPr id="4" name="Immagine 3" descr="Immagine che contiene testo, schermata, numero, parole crociate&#10;&#10;Descrizione generata automaticamente">
+            <a:extLst>
+              <a:ext uri="{FF2B5EF4-FFF2-40B4-BE49-F238E27FC236}">
+                <a16:creationId xmlns:a16="http://schemas.microsoft.com/office/drawing/2014/main" id="{47E6D29D-F3D0-7C83-8287-DE0FFE8A1EF4}"/>
+              </a:ext>
+            </a:extLst>
+          </p:cNvPr>
+          <p:cNvPicPr>
+            <a:picLocks noChangeAspect="1"/>
+          </p:cNvPicPr>
+          <p:nvPr/>
+        </p:nvPicPr>
+        <p:blipFill>
+          <a:blip r:embed="rId2"/>
+          <a:stretch>
+            <a:fillRect/>
+          </a:stretch>
+        </p:blipFill>
+        <p:spPr>
+          <a:xfrm>
+            <a:off x="4376199" y="883463"/>
+            <a:ext cx="2889292" cy="2918477"/>
+          </a:xfrm>
+          <a:prstGeom prst="rect">
+            <a:avLst/>
+          </a:prstGeom>
+        </p:spPr>
+      </p:pic>
+      <p:pic>
+        <p:nvPicPr>
+          <p:cNvPr id="6" name="Immagine 5" descr="Immagine che contiene testo, parole crociate, quadrato, numero&#10;&#10;Descrizione generata automaticamente">
+            <a:extLst>
+              <a:ext uri="{FF2B5EF4-FFF2-40B4-BE49-F238E27FC236}">
+                <a16:creationId xmlns:a16="http://schemas.microsoft.com/office/drawing/2014/main" id="{2F293F97-35D2-5382-A916-F26F801E1DDC}"/>
+              </a:ext>
+            </a:extLst>
+          </p:cNvPr>
+          <p:cNvPicPr>
+            <a:picLocks noChangeAspect="1"/>
+          </p:cNvPicPr>
+          <p:nvPr/>
+        </p:nvPicPr>
+        <p:blipFill>
+          <a:blip r:embed="rId3"/>
+          <a:stretch>
+            <a:fillRect/>
+          </a:stretch>
+        </p:blipFill>
+        <p:spPr>
+          <a:xfrm>
+            <a:off x="8154297" y="883462"/>
+            <a:ext cx="2918477" cy="2918477"/>
+          </a:xfrm>
+          <a:prstGeom prst="rect">
+            <a:avLst/>
+          </a:prstGeom>
+        </p:spPr>
+      </p:pic>
+      <p:pic>
+        <p:nvPicPr>
+          <p:cNvPr id="8" name="Immagine 7" descr="Immagine che contiene testo, Carattere, schermata, logo&#10;&#10;Descrizione generata automaticamente">
+            <a:extLst>
+              <a:ext uri="{FF2B5EF4-FFF2-40B4-BE49-F238E27FC236}">
+                <a16:creationId xmlns:a16="http://schemas.microsoft.com/office/drawing/2014/main" id="{5D096897-2512-FE0C-2708-7C31B2517FEB}"/>
+              </a:ext>
+            </a:extLst>
+          </p:cNvPr>
+          <p:cNvPicPr>
+            <a:picLocks noChangeAspect="1"/>
+          </p:cNvPicPr>
+          <p:nvPr/>
+        </p:nvPicPr>
+        <p:blipFill>
+          <a:blip r:embed="rId4"/>
+          <a:stretch>
+            <a:fillRect/>
+          </a:stretch>
+        </p:blipFill>
+        <p:spPr>
+          <a:xfrm>
+            <a:off x="3912011" y="3998228"/>
+            <a:ext cx="3703320" cy="1657235"/>
+          </a:xfrm>
+          <a:prstGeom prst="rect">
+            <a:avLst/>
+          </a:prstGeom>
+        </p:spPr>
+      </p:pic>
+      <p:pic>
+        <p:nvPicPr>
+          <p:cNvPr id="10" name="Immagine 9" descr="Immagine che contiene testo, Carattere, schermata, design&#10;&#10;Descrizione generata automaticamente">
+            <a:extLst>
+              <a:ext uri="{FF2B5EF4-FFF2-40B4-BE49-F238E27FC236}">
+                <a16:creationId xmlns:a16="http://schemas.microsoft.com/office/drawing/2014/main" id="{EF1B231A-6E31-A333-3783-DE459C79C457}"/>
+              </a:ext>
+            </a:extLst>
+          </p:cNvPr>
+          <p:cNvPicPr>
+            <a:picLocks noChangeAspect="1"/>
+          </p:cNvPicPr>
+          <p:nvPr/>
+        </p:nvPicPr>
+        <p:blipFill>
+          <a:blip r:embed="rId5"/>
+          <a:stretch>
+            <a:fillRect/>
+          </a:stretch>
+        </p:blipFill>
+        <p:spPr>
+          <a:xfrm>
+            <a:off x="7693945" y="3998228"/>
+            <a:ext cx="4117355" cy="1657235"/>
+          </a:xfrm>
+          <a:prstGeom prst="rect">
+            <a:avLst/>
+          </a:prstGeom>
+        </p:spPr>
+      </p:pic>
+    </p:spTree>
+    <p:extLst>
+      <p:ext uri="{BB962C8B-B14F-4D97-AF65-F5344CB8AC3E}">
+        <p14:creationId xmlns:p14="http://schemas.microsoft.com/office/powerpoint/2010/main" val="748313665"/>
+      </p:ext>
+    </p:extLst>
+  </p:cSld>
+  <p:clrMapOvr>
+    <a:masterClrMapping/>
+  </p:clrMapOvr>
+</p:sld>
+</file>
+
+<file path=ppt/slides/slide6.xml><?xml version="1.0" encoding="utf-8"?>
+<p:sld xmlns:a="http://schemas.openxmlformats.org/drawingml/2006/main" xmlns:r="http://schemas.openxmlformats.org/officeDocument/2006/relationships" xmlns:p="http://schemas.openxmlformats.org/presentationml/2006/main">
+  <p:cSld>
+    <p:bg>
+      <p:bgPr>
+        <a:solidFill>
+          <a:schemeClr val="bg1"/>
+        </a:solidFill>
+        <a:effectLst/>
+      </p:bgPr>
+    </p:bg>
+    <p:spTree>
+      <p:nvGrpSpPr>
+        <p:cNvPr id="1" name=""/>
+        <p:cNvGrpSpPr/>
+        <p:nvPr/>
+      </p:nvGrpSpPr>
+      <p:grpSpPr>
+        <a:xfrm>
+          <a:off x="0" y="0"/>
+          <a:ext cx="0" cy="0"/>
+          <a:chOff x="0" y="0"/>
+          <a:chExt cx="0" cy="0"/>
+        </a:xfrm>
+      </p:grpSpPr>
+      <p:sp useBgFill="1">
+        <p:nvSpPr>
           <p:cNvPr id="1072" name="Rectangle 1071">
             <a:extLst>
               <a:ext uri="{FF2B5EF4-FFF2-40B4-BE49-F238E27FC236}">
@@ -9611,7 +10469,574 @@
 </p:sld>
 </file>
 
-<file path=ppt/slides/slide6.xml><?xml version="1.0" encoding="utf-8"?>
+<file path=ppt/slides/slide7.xml><?xml version="1.0" encoding="utf-8"?>
+<p:sld xmlns:a="http://schemas.openxmlformats.org/drawingml/2006/main" xmlns:r="http://schemas.openxmlformats.org/officeDocument/2006/relationships" xmlns:p="http://schemas.openxmlformats.org/presentationml/2006/main">
+  <p:cSld>
+    <p:bg>
+      <p:bgPr>
+        <a:solidFill>
+          <a:schemeClr val="bg1"/>
+        </a:solidFill>
+        <a:effectLst/>
+      </p:bgPr>
+    </p:bg>
+    <p:spTree>
+      <p:nvGrpSpPr>
+        <p:cNvPr id="1" name=""/>
+        <p:cNvGrpSpPr/>
+        <p:nvPr/>
+      </p:nvGrpSpPr>
+      <p:grpSpPr>
+        <a:xfrm>
+          <a:off x="0" y="0"/>
+          <a:ext cx="0" cy="0"/>
+          <a:chOff x="0" y="0"/>
+          <a:chExt cx="0" cy="0"/>
+        </a:xfrm>
+      </p:grpSpPr>
+      <p:sp useBgFill="1">
+        <p:nvSpPr>
+          <p:cNvPr id="75" name="Rectangle 74">
+            <a:extLst>
+              <a:ext uri="{FF2B5EF4-FFF2-40B4-BE49-F238E27FC236}">
+                <a16:creationId xmlns:a16="http://schemas.microsoft.com/office/drawing/2014/main" id="{E3BF711F-F9A0-4EA4-B156-A79E9F362447}"/>
+              </a:ext>
+              <a:ext uri="{C183D7F6-B498-43B3-948B-1728B52AA6E4}">
+                <adec:decorative xmlns:adec="http://schemas.microsoft.com/office/drawing/2017/decorative" val="1"/>
+              </a:ext>
+            </a:extLst>
+          </p:cNvPr>
+          <p:cNvSpPr>
+            <a:spLocks noGrp="1" noRot="1" noChangeAspect="1" noMove="1" noResize="1" noEditPoints="1" noAdjustHandles="1" noChangeArrowheads="1" noChangeShapeType="1" noTextEdit="1"/>
+          </p:cNvSpPr>
+          <p:nvPr>
+            <p:extLst>
+              <p:ext uri="{386F3935-93C4-4BCD-93E2-E3B085C9AB24}">
+                <p16:designElem xmlns:p16="http://schemas.microsoft.com/office/powerpoint/2015/main" val="1"/>
+              </p:ext>
+            </p:extLst>
+          </p:nvPr>
+        </p:nvSpPr>
+        <p:spPr>
+          <a:xfrm>
+            <a:off x="0" y="0"/>
+            <a:ext cx="12191999" cy="6857365"/>
+          </a:xfrm>
+          <a:prstGeom prst="rect">
+            <a:avLst/>
+          </a:prstGeom>
+          <a:ln>
+            <a:noFill/>
+          </a:ln>
+        </p:spPr>
+        <p:style>
+          <a:lnRef idx="2">
+            <a:schemeClr val="accent1">
+              <a:shade val="50000"/>
+            </a:schemeClr>
+          </a:lnRef>
+          <a:fillRef idx="1">
+            <a:schemeClr val="accent1"/>
+          </a:fillRef>
+          <a:effectRef idx="0">
+            <a:schemeClr val="accent1"/>
+          </a:effectRef>
+          <a:fontRef idx="minor">
+            <a:schemeClr val="lt1"/>
+          </a:fontRef>
+        </p:style>
+        <p:txBody>
+          <a:bodyPr rtlCol="0" anchor="ctr"/>
+          <a:lstStyle/>
+          <a:p>
+            <a:pPr algn="ctr"/>
+            <a:endParaRPr lang="en-US"/>
+          </a:p>
+        </p:txBody>
+      </p:sp>
+      <p:grpSp>
+        <p:nvGrpSpPr>
+          <p:cNvPr id="77" name="Group 76">
+            <a:extLst>
+              <a:ext uri="{FF2B5EF4-FFF2-40B4-BE49-F238E27FC236}">
+                <a16:creationId xmlns:a16="http://schemas.microsoft.com/office/drawing/2014/main" id="{B83D307E-DF68-43F8-97CE-0AAE950A7129}"/>
+              </a:ext>
+              <a:ext uri="{C183D7F6-B498-43B3-948B-1728B52AA6E4}">
+                <adec:decorative xmlns:adec="http://schemas.microsoft.com/office/drawing/2017/decorative" val="1"/>
+              </a:ext>
+            </a:extLst>
+          </p:cNvPr>
+          <p:cNvGrpSpPr>
+            <a:grpSpLocks noGrp="1" noUngrp="1" noRot="1" noChangeAspect="1" noMove="1" noResize="1"/>
+          </p:cNvGrpSpPr>
+          <p:nvPr>
+            <p:extLst>
+              <p:ext uri="{386F3935-93C4-4BCD-93E2-E3B085C9AB24}">
+                <p16:designElem xmlns:p16="http://schemas.microsoft.com/office/powerpoint/2015/main" val="1"/>
+              </p:ext>
+            </p:extLst>
+          </p:nvPr>
+        </p:nvGrpSpPr>
+        <p:grpSpPr>
+          <a:xfrm>
+            <a:off x="2271255" y="-1"/>
+            <a:ext cx="7649490" cy="5728133"/>
+            <a:chOff x="329184" y="1"/>
+            <a:chExt cx="524256" cy="5728133"/>
+          </a:xfrm>
+        </p:grpSpPr>
+        <p:cxnSp>
+          <p:nvCxnSpPr>
+            <p:cNvPr id="78" name="Straight Connector 77">
+              <a:extLst>
+                <a:ext uri="{FF2B5EF4-FFF2-40B4-BE49-F238E27FC236}">
+                  <a16:creationId xmlns:a16="http://schemas.microsoft.com/office/drawing/2014/main" id="{5546E3D2-37BF-4528-9851-2B2F628234A2}"/>
+                </a:ext>
+                <a:ext uri="{C183D7F6-B498-43B3-948B-1728B52AA6E4}">
+                  <adec:decorative xmlns:adec="http://schemas.microsoft.com/office/drawing/2017/decorative" val="1"/>
+                </a:ext>
+              </a:extLst>
+            </p:cNvPr>
+            <p:cNvCxnSpPr>
+              <a:cxnSpLocks/>
+            </p:cNvCxnSpPr>
+            <p:nvPr>
+              <p:extLst>
+                <p:ext uri="{386F3935-93C4-4BCD-93E2-E3B085C9AB24}">
+                  <p16:designElem xmlns:p16="http://schemas.microsoft.com/office/powerpoint/2015/main" val="1"/>
+                </p:ext>
+              </p:extLst>
+            </p:nvPr>
+          </p:nvCxnSpPr>
+          <p:spPr>
+            <a:xfrm flipH="1">
+              <a:off x="329184" y="5728134"/>
+              <a:ext cx="523824" cy="0"/>
+            </a:xfrm>
+            <a:prstGeom prst="line">
+              <a:avLst/>
+            </a:prstGeom>
+            <a:ln w="152400">
+              <a:solidFill>
+                <a:schemeClr val="accent4"/>
+              </a:solidFill>
+            </a:ln>
+          </p:spPr>
+          <p:style>
+            <a:lnRef idx="1">
+              <a:schemeClr val="accent1"/>
+            </a:lnRef>
+            <a:fillRef idx="0">
+              <a:schemeClr val="accent1"/>
+            </a:fillRef>
+            <a:effectRef idx="0">
+              <a:schemeClr val="accent1"/>
+            </a:effectRef>
+            <a:fontRef idx="minor">
+              <a:schemeClr val="tx1"/>
+            </a:fontRef>
+          </p:style>
+        </p:cxnSp>
+        <p:sp>
+          <p:nvSpPr>
+            <p:cNvPr id="79" name="Rectangle 78">
+              <a:extLst>
+                <a:ext uri="{FF2B5EF4-FFF2-40B4-BE49-F238E27FC236}">
+                  <a16:creationId xmlns:a16="http://schemas.microsoft.com/office/drawing/2014/main" id="{752A0C69-DC4E-4FC0-843C-BAA27B3A5621}"/>
+                </a:ext>
+                <a:ext uri="{C183D7F6-B498-43B3-948B-1728B52AA6E4}">
+                  <adec:decorative xmlns:adec="http://schemas.microsoft.com/office/drawing/2017/decorative" val="1"/>
+                </a:ext>
+              </a:extLst>
+            </p:cNvPr>
+            <p:cNvSpPr/>
+            <p:nvPr>
+              <p:extLst>
+                <p:ext uri="{386F3935-93C4-4BCD-93E2-E3B085C9AB24}">
+                  <p16:designElem xmlns:p16="http://schemas.microsoft.com/office/powerpoint/2015/main" val="1"/>
+                </p:ext>
+              </p:extLst>
+            </p:nvPr>
+          </p:nvSpPr>
+          <p:spPr>
+            <a:xfrm>
+              <a:off x="329184" y="1"/>
+              <a:ext cx="524256" cy="5532119"/>
+            </a:xfrm>
+            <a:prstGeom prst="rect">
+              <a:avLst/>
+            </a:prstGeom>
+            <a:solidFill>
+              <a:schemeClr val="accent4"/>
+            </a:solidFill>
+            <a:ln>
+              <a:noFill/>
+            </a:ln>
+          </p:spPr>
+          <p:style>
+            <a:lnRef idx="2">
+              <a:schemeClr val="accent1">
+                <a:shade val="50000"/>
+              </a:schemeClr>
+            </a:lnRef>
+            <a:fillRef idx="1">
+              <a:schemeClr val="accent1"/>
+            </a:fillRef>
+            <a:effectRef idx="0">
+              <a:schemeClr val="accent1"/>
+            </a:effectRef>
+            <a:fontRef idx="minor">
+              <a:schemeClr val="lt1"/>
+            </a:fontRef>
+          </p:style>
+          <p:txBody>
+            <a:bodyPr rtlCol="0" anchor="ctr"/>
+            <a:lstStyle/>
+            <a:p>
+              <a:pPr algn="ctr"/>
+              <a:endParaRPr lang="en-US" dirty="0"/>
+            </a:p>
+          </p:txBody>
+        </p:sp>
+      </p:grpSp>
+      <p:sp>
+        <p:nvSpPr>
+          <p:cNvPr id="81" name="Rectangle 80">
+            <a:extLst>
+              <a:ext uri="{FF2B5EF4-FFF2-40B4-BE49-F238E27FC236}">
+                <a16:creationId xmlns:a16="http://schemas.microsoft.com/office/drawing/2014/main" id="{8ED94938-268E-4C0A-A08A-B3980C78BAEB}"/>
+              </a:ext>
+              <a:ext uri="{C183D7F6-B498-43B3-948B-1728B52AA6E4}">
+                <adec:decorative xmlns:adec="http://schemas.microsoft.com/office/drawing/2017/decorative" val="1"/>
+              </a:ext>
+            </a:extLst>
+          </p:cNvPr>
+          <p:cNvSpPr>
+            <a:spLocks noGrp="1" noRot="1" noChangeAspect="1" noMove="1" noResize="1" noEditPoints="1" noAdjustHandles="1" noChangeArrowheads="1" noChangeShapeType="1" noTextEdit="1"/>
+          </p:cNvSpPr>
+          <p:nvPr>
+            <p:extLst>
+              <p:ext uri="{386F3935-93C4-4BCD-93E2-E3B085C9AB24}">
+                <p16:designElem xmlns:p16="http://schemas.microsoft.com/office/powerpoint/2015/main" val="1"/>
+              </p:ext>
+            </p:extLst>
+          </p:nvPr>
+        </p:nvSpPr>
+        <p:spPr>
+          <a:xfrm>
+            <a:off x="596464" y="318045"/>
+            <a:ext cx="10999072" cy="5325139"/>
+          </a:xfrm>
+          <a:prstGeom prst="rect">
+            <a:avLst/>
+          </a:prstGeom>
+          <a:solidFill>
+            <a:schemeClr val="bg1"/>
+          </a:solidFill>
+          <a:ln>
+            <a:noFill/>
+          </a:ln>
+          <a:effectLst>
+            <a:outerShdw blurRad="139700" dist="127000" dir="5400000" algn="t" rotWithShape="0">
+              <a:prstClr val="black">
+                <a:alpha val="15000"/>
+              </a:prstClr>
+            </a:outerShdw>
+          </a:effectLst>
+        </p:spPr>
+        <p:style>
+          <a:lnRef idx="2">
+            <a:schemeClr val="accent1">
+              <a:shade val="50000"/>
+            </a:schemeClr>
+          </a:lnRef>
+          <a:fillRef idx="1">
+            <a:schemeClr val="accent1"/>
+          </a:fillRef>
+          <a:effectRef idx="0">
+            <a:schemeClr val="accent1"/>
+          </a:effectRef>
+          <a:fontRef idx="minor">
+            <a:schemeClr val="lt1"/>
+          </a:fontRef>
+        </p:style>
+        <p:txBody>
+          <a:bodyPr rtlCol="0" anchor="ctr"/>
+          <a:lstStyle/>
+          <a:p>
+            <a:pPr algn="ctr"/>
+            <a:endParaRPr lang="en-US"/>
+          </a:p>
+        </p:txBody>
+      </p:sp>
+      <p:sp>
+        <p:nvSpPr>
+          <p:cNvPr id="10" name="Titolo 1">
+            <a:extLst>
+              <a:ext uri="{FF2B5EF4-FFF2-40B4-BE49-F238E27FC236}">
+                <a16:creationId xmlns:a16="http://schemas.microsoft.com/office/drawing/2014/main" id="{F282D56C-2888-FF7F-C686-7DC48E35B79A}"/>
+              </a:ext>
+            </a:extLst>
+          </p:cNvPr>
+          <p:cNvSpPr txBox="1">
+            <a:spLocks/>
+          </p:cNvSpPr>
+          <p:nvPr/>
+        </p:nvSpPr>
+        <p:spPr>
+          <a:xfrm>
+            <a:off x="1060232" y="3933818"/>
+            <a:ext cx="10125928" cy="1491622"/>
+          </a:xfrm>
+          <a:prstGeom prst="rect">
+            <a:avLst/>
+          </a:prstGeom>
+        </p:spPr>
+        <p:txBody>
+          <a:bodyPr vert="horz" lIns="91440" tIns="45720" rIns="91440" bIns="45720" rtlCol="0" anchor="b">
+            <a:normAutofit lnSpcReduction="10000"/>
+          </a:bodyPr>
+          <a:lstStyle>
+            <a:lvl1pPr algn="l" defTabSz="914400" rtl="0" eaLnBrk="1" latinLnBrk="0" hangingPunct="1">
+              <a:lnSpc>
+                <a:spcPct val="90000"/>
+              </a:lnSpc>
+              <a:spcBef>
+                <a:spcPct val="0"/>
+              </a:spcBef>
+              <a:buNone/>
+              <a:defRPr sz="4400" kern="1200">
+                <a:solidFill>
+                  <a:schemeClr val="tx1"/>
+                </a:solidFill>
+                <a:latin typeface="+mj-lt"/>
+                <a:ea typeface="+mj-ea"/>
+                <a:cs typeface="+mj-cs"/>
+              </a:defRPr>
+            </a:lvl1pPr>
+          </a:lstStyle>
+          <a:p>
+            <a:pPr algn="ctr">
+              <a:spcAft>
+                <a:spcPts val="600"/>
+              </a:spcAft>
+            </a:pPr>
+            <a:r>
+              <a:rPr lang="en-US" sz="5200" kern="1200" dirty="0">
+                <a:solidFill>
+                  <a:schemeClr val="tx1"/>
+                </a:solidFill>
+                <a:latin typeface="+mj-lt"/>
+                <a:ea typeface="+mj-ea"/>
+                <a:cs typeface="+mj-cs"/>
+              </a:rPr>
+              <a:t>Un po’ di </a:t>
+            </a:r>
+            <a:r>
+              <a:rPr lang="en-US" sz="5200" kern="1200" dirty="0" err="1">
+                <a:solidFill>
+                  <a:schemeClr val="tx1"/>
+                </a:solidFill>
+                <a:latin typeface="+mj-lt"/>
+                <a:ea typeface="+mj-ea"/>
+                <a:cs typeface="+mj-cs"/>
+              </a:rPr>
+              <a:t>codice</a:t>
+            </a:r>
+            <a:r>
+              <a:rPr lang="en-US" sz="5200" kern="1200" dirty="0">
+                <a:solidFill>
+                  <a:schemeClr val="tx1"/>
+                </a:solidFill>
+                <a:latin typeface="+mj-lt"/>
+                <a:ea typeface="+mj-ea"/>
+                <a:cs typeface="+mj-cs"/>
+              </a:rPr>
+              <a:t>…</a:t>
+            </a:r>
+          </a:p>
+          <a:p>
+            <a:pPr algn="ctr">
+              <a:spcAft>
+                <a:spcPts val="600"/>
+              </a:spcAft>
+            </a:pPr>
+            <a:r>
+              <a:rPr lang="en-US" sz="2400" dirty="0" err="1"/>
+              <a:t>Puoi</a:t>
+            </a:r>
+            <a:r>
+              <a:rPr lang="en-US" sz="2400" dirty="0"/>
+              <a:t> </a:t>
+            </a:r>
+            <a:r>
+              <a:rPr lang="en-US" sz="2400" dirty="0" err="1"/>
+              <a:t>trovare</a:t>
+            </a:r>
+            <a:r>
+              <a:rPr lang="en-US" sz="2400" dirty="0"/>
+              <a:t> </a:t>
+            </a:r>
+            <a:r>
+              <a:rPr lang="en-US" sz="2400" dirty="0" err="1"/>
+              <a:t>tutto</a:t>
+            </a:r>
+            <a:r>
+              <a:rPr lang="en-US" sz="2400" dirty="0"/>
+              <a:t> il </a:t>
+            </a:r>
+            <a:r>
+              <a:rPr lang="en-US" sz="2400" dirty="0" err="1"/>
+              <a:t>codice</a:t>
+            </a:r>
+            <a:r>
+              <a:rPr lang="en-US" sz="2400" dirty="0"/>
+              <a:t> </a:t>
+            </a:r>
+            <a:r>
+              <a:rPr lang="en-US" sz="2400"/>
+              <a:t>completo </a:t>
+            </a:r>
+            <a:r>
+              <a:rPr lang="en-US" sz="2400" dirty="0"/>
+              <a:t>qui: </a:t>
+            </a:r>
+            <a:r>
+              <a:rPr lang="en-US" sz="2400" dirty="0">
+                <a:hlinkClick r:id="rId2"/>
+              </a:rPr>
+              <a:t>https://github.com/lucabertiato/lucabertiato.github.io.git</a:t>
+            </a:r>
+            <a:endParaRPr lang="en-US" sz="2400" kern="1200" dirty="0">
+              <a:solidFill>
+                <a:schemeClr val="tx1"/>
+              </a:solidFill>
+              <a:latin typeface="+mj-lt"/>
+              <a:ea typeface="+mj-ea"/>
+              <a:cs typeface="+mj-cs"/>
+            </a:endParaRPr>
+          </a:p>
+        </p:txBody>
+      </p:sp>
+      <p:pic>
+        <p:nvPicPr>
+          <p:cNvPr id="5" name="Immagine 4" descr="Immagine che contiene testo, elettronica, schermata, schermo&#10;&#10;Descrizione generata automaticamente">
+            <a:extLst>
+              <a:ext uri="{FF2B5EF4-FFF2-40B4-BE49-F238E27FC236}">
+                <a16:creationId xmlns:a16="http://schemas.microsoft.com/office/drawing/2014/main" id="{F16DCFD2-3C45-AA11-3A9C-0DD51A5A0DB1}"/>
+              </a:ext>
+            </a:extLst>
+          </p:cNvPr>
+          <p:cNvPicPr>
+            <a:picLocks noChangeAspect="1"/>
+          </p:cNvPicPr>
+          <p:nvPr/>
+        </p:nvPicPr>
+        <p:blipFill rotWithShape="1">
+          <a:blip r:embed="rId3">
+            <a:extLst>
+              <a:ext uri="{28A0092B-C50C-407E-A947-70E740481C1C}">
+                <a14:useLocalDpi xmlns:a14="http://schemas.microsoft.com/office/drawing/2010/main" val="0"/>
+              </a:ext>
+            </a:extLst>
+          </a:blip>
+          <a:srcRect t="2145" b="2983"/>
+          <a:stretch/>
+        </p:blipFill>
+        <p:spPr>
+          <a:xfrm>
+            <a:off x="843531" y="813261"/>
+            <a:ext cx="3441461" cy="2783379"/>
+          </a:xfrm>
+          <a:prstGeom prst="rect">
+            <a:avLst/>
+          </a:prstGeom>
+        </p:spPr>
+      </p:pic>
+      <p:pic>
+        <p:nvPicPr>
+          <p:cNvPr id="7" name="Immagine 6" descr="Immagine che contiene testo, schermata, software, multimediale&#10;&#10;Descrizione generata automaticamente">
+            <a:extLst>
+              <a:ext uri="{FF2B5EF4-FFF2-40B4-BE49-F238E27FC236}">
+                <a16:creationId xmlns:a16="http://schemas.microsoft.com/office/drawing/2014/main" id="{6D0CFF77-0FAF-5339-795F-0C005FF096B3}"/>
+              </a:ext>
+            </a:extLst>
+          </p:cNvPr>
+          <p:cNvPicPr>
+            <a:picLocks noChangeAspect="1"/>
+          </p:cNvPicPr>
+          <p:nvPr/>
+        </p:nvPicPr>
+        <p:blipFill rotWithShape="1">
+          <a:blip r:embed="rId4">
+            <a:extLst>
+              <a:ext uri="{28A0092B-C50C-407E-A947-70E740481C1C}">
+                <a14:useLocalDpi xmlns:a14="http://schemas.microsoft.com/office/drawing/2010/main" val="0"/>
+              </a:ext>
+            </a:extLst>
+          </a:blip>
+          <a:srcRect l="4758" r="5295" b="4"/>
+          <a:stretch/>
+        </p:blipFill>
+        <p:spPr>
+          <a:xfrm>
+            <a:off x="4396332" y="813261"/>
+            <a:ext cx="3441461" cy="2783379"/>
+          </a:xfrm>
+          <a:prstGeom prst="rect">
+            <a:avLst/>
+          </a:prstGeom>
+        </p:spPr>
+      </p:pic>
+      <p:pic>
+        <p:nvPicPr>
+          <p:cNvPr id="9" name="Immagine 8" descr="Immagine che contiene testo, schermata, software&#10;&#10;Descrizione generata automaticamente">
+            <a:extLst>
+              <a:ext uri="{FF2B5EF4-FFF2-40B4-BE49-F238E27FC236}">
+                <a16:creationId xmlns:a16="http://schemas.microsoft.com/office/drawing/2014/main" id="{B2D92975-E6E8-8E7B-DD28-87589ADD8EA4}"/>
+              </a:ext>
+            </a:extLst>
+          </p:cNvPr>
+          <p:cNvPicPr>
+            <a:picLocks noChangeAspect="1"/>
+          </p:cNvPicPr>
+          <p:nvPr/>
+        </p:nvPicPr>
+        <p:blipFill rotWithShape="1">
+          <a:blip r:embed="rId5">
+            <a:extLst>
+              <a:ext uri="{28A0092B-C50C-407E-A947-70E740481C1C}">
+                <a14:useLocalDpi xmlns:a14="http://schemas.microsoft.com/office/drawing/2010/main" val="0"/>
+              </a:ext>
+            </a:extLst>
+          </a:blip>
+          <a:srcRect l="6680" r="7392" b="4"/>
+          <a:stretch/>
+        </p:blipFill>
+        <p:spPr>
+          <a:xfrm>
+            <a:off x="7955023" y="813261"/>
+            <a:ext cx="3441461" cy="2783379"/>
+          </a:xfrm>
+          <a:prstGeom prst="rect">
+            <a:avLst/>
+          </a:prstGeom>
+        </p:spPr>
+      </p:pic>
+    </p:spTree>
+    <p:extLst>
+      <p:ext uri="{BB962C8B-B14F-4D97-AF65-F5344CB8AC3E}">
+        <p14:creationId xmlns:p14="http://schemas.microsoft.com/office/powerpoint/2010/main" val="2764990116"/>
+      </p:ext>
+    </p:extLst>
+  </p:cSld>
+  <p:clrMapOvr>
+    <a:masterClrMapping/>
+  </p:clrMapOvr>
+</p:sld>
+</file>
+
+<file path=ppt/slides/slide8.xml><?xml version="1.0" encoding="utf-8"?>
 <p:sld xmlns:a="http://schemas.openxmlformats.org/drawingml/2006/main" xmlns:r="http://schemas.openxmlformats.org/officeDocument/2006/relationships" xmlns:p="http://schemas.openxmlformats.org/presentationml/2006/main">
   <p:cSld>
     <p:bg>

</xml_diff>